<commit_message>
Added additional java implementation of subtyping
</commit_message>
<xml_diff>
--- a/week_5/Subtyping and Subclassing.pptx
+++ b/week_5/Subtyping and Subclassing.pptx
@@ -6527,6 +6527,114 @@
           </a:p>
         </p:txBody>
       </p:sp>
+      <p:pic>
+        <p:nvPicPr>
+          <p:cNvPr id="6" name="Picture 5" descr="A close-up of a cell phone&#10;&#10;Description automatically generated with low confidence">
+            <a:extLst>
+              <a:ext uri="{FF2B5EF4-FFF2-40B4-BE49-F238E27FC236}">
+                <a16:creationId xmlns:a16="http://schemas.microsoft.com/office/drawing/2014/main" id="{14AA7B6E-F3C2-029A-C1AD-F08A86212D35}"/>
+              </a:ext>
+            </a:extLst>
+          </p:cNvPr>
+          <p:cNvPicPr>
+            <a:picLocks noChangeAspect="1"/>
+          </p:cNvPicPr>
+          <p:nvPr/>
+        </p:nvPicPr>
+        <p:blipFill>
+          <a:blip r:embed="rId4">
+            <a:extLst>
+              <a:ext uri="{28A0092B-C50C-407E-A947-70E740481C1C}">
+                <a14:useLocalDpi xmlns:a14="http://schemas.microsoft.com/office/drawing/2010/main" val="0"/>
+              </a:ext>
+            </a:extLst>
+          </a:blip>
+          <a:stretch>
+            <a:fillRect/>
+          </a:stretch>
+        </p:blipFill>
+        <p:spPr>
+          <a:xfrm>
+            <a:off x="4612203" y="1767935"/>
+            <a:ext cx="743182" cy="880274"/>
+          </a:xfrm>
+          <a:prstGeom prst="rect">
+            <a:avLst/>
+          </a:prstGeom>
+        </p:spPr>
+      </p:pic>
+      <p:pic>
+        <p:nvPicPr>
+          <p:cNvPr id="13" name="Picture 12" descr="Icon&#10;&#10;Description automatically generated">
+            <a:extLst>
+              <a:ext uri="{FF2B5EF4-FFF2-40B4-BE49-F238E27FC236}">
+                <a16:creationId xmlns:a16="http://schemas.microsoft.com/office/drawing/2014/main" id="{8EDE074A-1AF2-511E-242B-BB55BD5FBA34}"/>
+              </a:ext>
+            </a:extLst>
+          </p:cNvPr>
+          <p:cNvPicPr>
+            <a:picLocks noChangeAspect="1"/>
+          </p:cNvPicPr>
+          <p:nvPr/>
+        </p:nvPicPr>
+        <p:blipFill>
+          <a:blip r:embed="rId5">
+            <a:extLst>
+              <a:ext uri="{28A0092B-C50C-407E-A947-70E740481C1C}">
+                <a14:useLocalDpi xmlns:a14="http://schemas.microsoft.com/office/drawing/2010/main" val="0"/>
+              </a:ext>
+            </a:extLst>
+          </a:blip>
+          <a:stretch>
+            <a:fillRect/>
+          </a:stretch>
+        </p:blipFill>
+        <p:spPr>
+          <a:xfrm>
+            <a:off x="595055" y="1577443"/>
+            <a:ext cx="1092856" cy="1092856"/>
+          </a:xfrm>
+          <a:prstGeom prst="rect">
+            <a:avLst/>
+          </a:prstGeom>
+        </p:spPr>
+      </p:pic>
+      <p:pic>
+        <p:nvPicPr>
+          <p:cNvPr id="15" name="Picture 14" descr="A close-up of a cell phone&#10;&#10;Description automatically generated with low confidence">
+            <a:extLst>
+              <a:ext uri="{FF2B5EF4-FFF2-40B4-BE49-F238E27FC236}">
+                <a16:creationId xmlns:a16="http://schemas.microsoft.com/office/drawing/2014/main" id="{76CEE079-6CCC-65B6-04EF-4225D16D58B0}"/>
+              </a:ext>
+            </a:extLst>
+          </p:cNvPr>
+          <p:cNvPicPr>
+            <a:picLocks noChangeAspect="1"/>
+          </p:cNvPicPr>
+          <p:nvPr/>
+        </p:nvPicPr>
+        <p:blipFill>
+          <a:blip r:embed="rId6">
+            <a:extLst>
+              <a:ext uri="{28A0092B-C50C-407E-A947-70E740481C1C}">
+                <a14:useLocalDpi xmlns:a14="http://schemas.microsoft.com/office/drawing/2010/main" val="0"/>
+              </a:ext>
+            </a:extLst>
+          </a:blip>
+          <a:stretch>
+            <a:fillRect/>
+          </a:stretch>
+        </p:blipFill>
+        <p:spPr>
+          <a:xfrm>
+            <a:off x="8802789" y="1652945"/>
+            <a:ext cx="946096" cy="1120618"/>
+          </a:xfrm>
+          <a:prstGeom prst="rect">
+            <a:avLst/>
+          </a:prstGeom>
+        </p:spPr>
+      </p:pic>
     </p:spTree>
     <p:extLst>
       <p:ext uri="{BB962C8B-B14F-4D97-AF65-F5344CB8AC3E}">
@@ -6537,124 +6645,6 @@
   <p:clrMapOvr>
     <a:masterClrMapping/>
   </p:clrMapOvr>
-  <p:timing>
-    <p:tnLst>
-      <p:par>
-        <p:cTn id="1" dur="indefinite" restart="never" nodeType="tmRoot">
-          <p:childTnLst>
-            <p:seq concurrent="1" nextAc="seek">
-              <p:cTn id="2" dur="indefinite" nodeType="mainSeq">
-                <p:childTnLst>
-                  <p:par>
-                    <p:cTn id="3" fill="hold">
-                      <p:stCondLst>
-                        <p:cond delay="indefinite"/>
-                      </p:stCondLst>
-                      <p:childTnLst>
-                        <p:par>
-                          <p:cTn id="4" fill="hold">
-                            <p:stCondLst>
-                              <p:cond delay="0"/>
-                            </p:stCondLst>
-                            <p:childTnLst>
-                              <p:par>
-                                <p:cTn id="5" presetID="14" presetClass="entr" presetSubtype="10" fill="hold" nodeType="clickEffect">
-                                  <p:stCondLst>
-                                    <p:cond delay="0"/>
-                                  </p:stCondLst>
-                                  <p:childTnLst>
-                                    <p:set>
-                                      <p:cBhvr>
-                                        <p:cTn id="6" dur="1" fill="hold">
-                                          <p:stCondLst>
-                                            <p:cond delay="0"/>
-                                          </p:stCondLst>
-                                        </p:cTn>
-                                        <p:tgtEl>
-                                          <p:spTgt spid="11"/>
-                                        </p:tgtEl>
-                                        <p:attrNameLst>
-                                          <p:attrName>style.visibility</p:attrName>
-                                        </p:attrNameLst>
-                                      </p:cBhvr>
-                                      <p:to>
-                                        <p:strVal val="visible"/>
-                                      </p:to>
-                                    </p:set>
-                                    <p:animEffect transition="in" filter="randombar(horizontal)">
-                                      <p:cBhvr>
-                                        <p:cTn id="7" dur="500"/>
-                                        <p:tgtEl>
-                                          <p:spTgt spid="11"/>
-                                        </p:tgtEl>
-                                      </p:cBhvr>
-                                    </p:animEffect>
-                                  </p:childTnLst>
-                                </p:cTn>
-                              </p:par>
-                              <p:par>
-                                <p:cTn id="8" presetID="14" presetClass="entr" presetSubtype="10" fill="hold" nodeType="withEffect">
-                                  <p:stCondLst>
-                                    <p:cond delay="0"/>
-                                  </p:stCondLst>
-                                  <p:childTnLst>
-                                    <p:set>
-                                      <p:cBhvr>
-                                        <p:cTn id="9" dur="1" fill="hold">
-                                          <p:stCondLst>
-                                            <p:cond delay="0"/>
-                                          </p:stCondLst>
-                                        </p:cTn>
-                                        <p:tgtEl>
-                                          <p:spTgt spid="12"/>
-                                        </p:tgtEl>
-                                        <p:attrNameLst>
-                                          <p:attrName>style.visibility</p:attrName>
-                                        </p:attrNameLst>
-                                      </p:cBhvr>
-                                      <p:to>
-                                        <p:strVal val="visible"/>
-                                      </p:to>
-                                    </p:set>
-                                    <p:animEffect transition="in" filter="randombar(horizontal)">
-                                      <p:cBhvr>
-                                        <p:cTn id="10" dur="500"/>
-                                        <p:tgtEl>
-                                          <p:spTgt spid="12"/>
-                                        </p:tgtEl>
-                                      </p:cBhvr>
-                                    </p:animEffect>
-                                  </p:childTnLst>
-                                </p:cTn>
-                              </p:par>
-                            </p:childTnLst>
-                          </p:cTn>
-                        </p:par>
-                      </p:childTnLst>
-                    </p:cTn>
-                  </p:par>
-                </p:childTnLst>
-              </p:cTn>
-              <p:prevCondLst>
-                <p:cond evt="onPrev" delay="0">
-                  <p:tgtEl>
-                    <p:sldTgt/>
-                  </p:tgtEl>
-                </p:cond>
-              </p:prevCondLst>
-              <p:nextCondLst>
-                <p:cond evt="onNext" delay="0">
-                  <p:tgtEl>
-                    <p:sldTgt/>
-                  </p:tgtEl>
-                </p:cond>
-              </p:nextCondLst>
-            </p:seq>
-          </p:childTnLst>
-        </p:cTn>
-      </p:par>
-    </p:tnLst>
-  </p:timing>
 </p:sld>
 </file>
 
@@ -6909,13 +6899,13 @@
           <p:nvPr>
             <p:extLst>
               <p:ext uri="{D42A27DB-BD31-4B8C-83A1-F6EECF244321}">
-                <p14:modId xmlns:p14="http://schemas.microsoft.com/office/powerpoint/2010/main" val="50995198"/>
+                <p14:modId xmlns:p14="http://schemas.microsoft.com/office/powerpoint/2010/main" val="376986256"/>
               </p:ext>
             </p:extLst>
           </p:nvPr>
         </p:nvGraphicFramePr>
         <p:xfrm>
-          <a:off x="430129" y="2798963"/>
+          <a:off x="732934" y="2704787"/>
           <a:ext cx="3535902" cy="1097280"/>
         </p:xfrm>
         <a:graphic>
@@ -6942,7 +6932,7 @@
                       <a:pPr algn="ctr"/>
                       <a:r>
                         <a:rPr lang="en-PH" b="1" dirty="0" err="1"/>
-                        <a:t>NoCamera</a:t>
+                        <a:t>iPadWithNoCamera</a:t>
                       </a:r>
                       <a:endParaRPr lang="en-PH" b="1" dirty="0"/>
                     </a:p>
@@ -7011,8 +7001,8 @@
         </p:nvCxnSpPr>
         <p:spPr>
           <a:xfrm rot="5400000" flipH="1" flipV="1">
-            <a:off x="2521293" y="696852"/>
-            <a:ext cx="1778898" cy="2425324"/>
+            <a:off x="2719783" y="801167"/>
+            <a:ext cx="1684722" cy="2122519"/>
           </a:xfrm>
           <a:prstGeom prst="bentConnector2">
             <a:avLst/>
@@ -7054,8 +7044,8 @@
         </p:nvCxnSpPr>
         <p:spPr>
           <a:xfrm rot="16200000" flipV="1">
-            <a:off x="6794493" y="772779"/>
-            <a:ext cx="1684722" cy="2179293"/>
+            <a:off x="6797191" y="770082"/>
+            <a:ext cx="1679327" cy="2179293"/>
           </a:xfrm>
           <a:prstGeom prst="bentConnector2">
             <a:avLst/>
@@ -7094,13 +7084,13 @@
           <p:nvPr>
             <p:extLst>
               <p:ext uri="{D42A27DB-BD31-4B8C-83A1-F6EECF244321}">
-                <p14:modId xmlns:p14="http://schemas.microsoft.com/office/powerpoint/2010/main" val="798426304"/>
+                <p14:modId xmlns:p14="http://schemas.microsoft.com/office/powerpoint/2010/main" val="276096243"/>
               </p:ext>
             </p:extLst>
           </p:nvPr>
         </p:nvGraphicFramePr>
         <p:xfrm>
-          <a:off x="7123474" y="2704787"/>
+          <a:off x="7123474" y="2699392"/>
           <a:ext cx="3206052" cy="1097280"/>
         </p:xfrm>
         <a:graphic>
@@ -7126,9 +7116,10 @@
                     <a:p>
                       <a:pPr algn="ctr"/>
                       <a:r>
-                        <a:rPr lang="en-PH" b="1" dirty="0"/>
-                        <a:t>Camera</a:t>
+                        <a:rPr lang="en-PH" b="1" dirty="0" err="1"/>
+                        <a:t>iPadWithCamera</a:t>
                       </a:r>
+                      <a:endParaRPr lang="en-PH" b="1" dirty="0"/>
                     </a:p>
                   </a:txBody>
                   <a:tcPr/>
@@ -7533,8 +7524,8 @@
         </p:nvCxnSpPr>
         <p:spPr>
           <a:xfrm rot="5400000" flipH="1" flipV="1">
-            <a:off x="6053819" y="3598624"/>
-            <a:ext cx="1414852" cy="724458"/>
+            <a:off x="6051122" y="3595927"/>
+            <a:ext cx="1420247" cy="724458"/>
           </a:xfrm>
           <a:prstGeom prst="bentConnector2">
             <a:avLst/>
@@ -7576,8 +7567,8 @@
         </p:nvCxnSpPr>
         <p:spPr>
           <a:xfrm rot="16200000" flipV="1">
-            <a:off x="9988039" y="3594914"/>
-            <a:ext cx="1407422" cy="724448"/>
+            <a:off x="9985342" y="3592217"/>
+            <a:ext cx="1412817" cy="724448"/>
           </a:xfrm>
           <a:prstGeom prst="bentConnector2">
             <a:avLst/>
@@ -7619,8 +7610,8 @@
         </p:nvCxnSpPr>
         <p:spPr>
           <a:xfrm flipV="1">
-            <a:off x="8726500" y="3802067"/>
-            <a:ext cx="0" cy="858782"/>
+            <a:off x="8726500" y="3796672"/>
+            <a:ext cx="0" cy="864177"/>
           </a:xfrm>
           <a:prstGeom prst="straightConnector1">
             <a:avLst/>
@@ -7659,13 +7650,13 @@
           <p:nvPr>
             <p:extLst>
               <p:ext uri="{D42A27DB-BD31-4B8C-83A1-F6EECF244321}">
-                <p14:modId xmlns:p14="http://schemas.microsoft.com/office/powerpoint/2010/main" val="1635373571"/>
+                <p14:modId xmlns:p14="http://schemas.microsoft.com/office/powerpoint/2010/main" val="2841634417"/>
               </p:ext>
             </p:extLst>
           </p:nvPr>
         </p:nvGraphicFramePr>
         <p:xfrm>
-          <a:off x="1179330" y="4660849"/>
+          <a:off x="1482135" y="4645750"/>
           <a:ext cx="2037499" cy="1097280"/>
         </p:xfrm>
         <a:graphic>
@@ -7760,8 +7751,8 @@
         </p:nvCxnSpPr>
         <p:spPr>
           <a:xfrm flipV="1">
-            <a:off x="2198079" y="3896243"/>
-            <a:ext cx="1" cy="764606"/>
+            <a:off x="2500884" y="3802067"/>
+            <a:ext cx="1" cy="843683"/>
           </a:xfrm>
           <a:prstGeom prst="straightConnector1">
             <a:avLst/>
@@ -7785,6 +7776,114 @@
           </a:fontRef>
         </p:style>
       </p:cxnSp>
+      <p:pic>
+        <p:nvPicPr>
+          <p:cNvPr id="6" name="Picture 5" descr="Icon&#10;&#10;Description automatically generated">
+            <a:extLst>
+              <a:ext uri="{FF2B5EF4-FFF2-40B4-BE49-F238E27FC236}">
+                <a16:creationId xmlns:a16="http://schemas.microsoft.com/office/drawing/2014/main" id="{E8997738-81D3-84BC-5082-BFF5BEDFB1AA}"/>
+              </a:ext>
+            </a:extLst>
+          </p:cNvPr>
+          <p:cNvPicPr>
+            <a:picLocks noChangeAspect="1"/>
+          </p:cNvPicPr>
+          <p:nvPr/>
+        </p:nvPicPr>
+        <p:blipFill>
+          <a:blip r:embed="rId4">
+            <a:extLst>
+              <a:ext uri="{28A0092B-C50C-407E-A947-70E740481C1C}">
+                <a14:useLocalDpi xmlns:a14="http://schemas.microsoft.com/office/drawing/2010/main" val="0"/>
+              </a:ext>
+            </a:extLst>
+          </a:blip>
+          <a:stretch>
+            <a:fillRect/>
+          </a:stretch>
+        </p:blipFill>
+        <p:spPr>
+          <a:xfrm>
+            <a:off x="5404132" y="3802067"/>
+            <a:ext cx="821548" cy="821548"/>
+          </a:xfrm>
+          <a:prstGeom prst="rect">
+            <a:avLst/>
+          </a:prstGeom>
+        </p:spPr>
+      </p:pic>
+      <p:pic>
+        <p:nvPicPr>
+          <p:cNvPr id="10" name="Picture 9" descr="A close-up of a cell phone&#10;&#10;Description automatically generated with low confidence">
+            <a:extLst>
+              <a:ext uri="{FF2B5EF4-FFF2-40B4-BE49-F238E27FC236}">
+                <a16:creationId xmlns:a16="http://schemas.microsoft.com/office/drawing/2014/main" id="{A1310A8A-4BDD-3BF1-0D32-852E6EF2C896}"/>
+              </a:ext>
+            </a:extLst>
+          </p:cNvPr>
+          <p:cNvPicPr>
+            <a:picLocks noChangeAspect="1"/>
+          </p:cNvPicPr>
+          <p:nvPr/>
+        </p:nvPicPr>
+        <p:blipFill>
+          <a:blip r:embed="rId5">
+            <a:extLst>
+              <a:ext uri="{28A0092B-C50C-407E-A947-70E740481C1C}">
+                <a14:useLocalDpi xmlns:a14="http://schemas.microsoft.com/office/drawing/2010/main" val="0"/>
+              </a:ext>
+            </a:extLst>
+          </a:blip>
+          <a:stretch>
+            <a:fillRect/>
+          </a:stretch>
+        </p:blipFill>
+        <p:spPr>
+          <a:xfrm>
+            <a:off x="7828705" y="3896243"/>
+            <a:ext cx="614093" cy="727372"/>
+          </a:xfrm>
+          <a:prstGeom prst="rect">
+            <a:avLst/>
+          </a:prstGeom>
+        </p:spPr>
+      </p:pic>
+      <p:pic>
+        <p:nvPicPr>
+          <p:cNvPr id="14" name="Picture 13" descr="A close-up of a cell phone&#10;&#10;Description automatically generated with low confidence">
+            <a:extLst>
+              <a:ext uri="{FF2B5EF4-FFF2-40B4-BE49-F238E27FC236}">
+                <a16:creationId xmlns:a16="http://schemas.microsoft.com/office/drawing/2014/main" id="{A877AD13-1F86-0ED9-7F9D-0945523C2312}"/>
+              </a:ext>
+            </a:extLst>
+          </p:cNvPr>
+          <p:cNvPicPr>
+            <a:picLocks noChangeAspect="1"/>
+          </p:cNvPicPr>
+          <p:nvPr/>
+        </p:nvPicPr>
+        <p:blipFill>
+          <a:blip r:embed="rId6">
+            <a:extLst>
+              <a:ext uri="{28A0092B-C50C-407E-A947-70E740481C1C}">
+                <a14:useLocalDpi xmlns:a14="http://schemas.microsoft.com/office/drawing/2010/main" val="0"/>
+              </a:ext>
+            </a:extLst>
+          </a:blip>
+          <a:stretch>
+            <a:fillRect/>
+          </a:stretch>
+        </p:blipFill>
+        <p:spPr>
+          <a:xfrm>
+            <a:off x="10134600" y="3874877"/>
+            <a:ext cx="645501" cy="764574"/>
+          </a:xfrm>
+          <a:prstGeom prst="rect">
+            <a:avLst/>
+          </a:prstGeom>
+        </p:spPr>
+      </p:pic>
     </p:spTree>
     <p:extLst>
       <p:ext uri="{BB962C8B-B14F-4D97-AF65-F5344CB8AC3E}">
@@ -7795,124 +7894,6 @@
   <p:clrMapOvr>
     <a:masterClrMapping/>
   </p:clrMapOvr>
-  <p:timing>
-    <p:tnLst>
-      <p:par>
-        <p:cTn id="1" dur="indefinite" restart="never" nodeType="tmRoot">
-          <p:childTnLst>
-            <p:seq concurrent="1" nextAc="seek">
-              <p:cTn id="2" dur="indefinite" nodeType="mainSeq">
-                <p:childTnLst>
-                  <p:par>
-                    <p:cTn id="3" fill="hold">
-                      <p:stCondLst>
-                        <p:cond delay="indefinite"/>
-                      </p:stCondLst>
-                      <p:childTnLst>
-                        <p:par>
-                          <p:cTn id="4" fill="hold">
-                            <p:stCondLst>
-                              <p:cond delay="0"/>
-                            </p:stCondLst>
-                            <p:childTnLst>
-                              <p:par>
-                                <p:cTn id="5" presetID="14" presetClass="entr" presetSubtype="10" fill="hold" nodeType="clickEffect">
-                                  <p:stCondLst>
-                                    <p:cond delay="0"/>
-                                  </p:stCondLst>
-                                  <p:childTnLst>
-                                    <p:set>
-                                      <p:cBhvr>
-                                        <p:cTn id="6" dur="1" fill="hold">
-                                          <p:stCondLst>
-                                            <p:cond delay="0"/>
-                                          </p:stCondLst>
-                                        </p:cTn>
-                                        <p:tgtEl>
-                                          <p:spTgt spid="11"/>
-                                        </p:tgtEl>
-                                        <p:attrNameLst>
-                                          <p:attrName>style.visibility</p:attrName>
-                                        </p:attrNameLst>
-                                      </p:cBhvr>
-                                      <p:to>
-                                        <p:strVal val="visible"/>
-                                      </p:to>
-                                    </p:set>
-                                    <p:animEffect transition="in" filter="randombar(horizontal)">
-                                      <p:cBhvr>
-                                        <p:cTn id="7" dur="500"/>
-                                        <p:tgtEl>
-                                          <p:spTgt spid="11"/>
-                                        </p:tgtEl>
-                                      </p:cBhvr>
-                                    </p:animEffect>
-                                  </p:childTnLst>
-                                </p:cTn>
-                              </p:par>
-                              <p:par>
-                                <p:cTn id="8" presetID="14" presetClass="entr" presetSubtype="10" fill="hold" nodeType="withEffect">
-                                  <p:stCondLst>
-                                    <p:cond delay="0"/>
-                                  </p:stCondLst>
-                                  <p:childTnLst>
-                                    <p:set>
-                                      <p:cBhvr>
-                                        <p:cTn id="9" dur="1" fill="hold">
-                                          <p:stCondLst>
-                                            <p:cond delay="0"/>
-                                          </p:stCondLst>
-                                        </p:cTn>
-                                        <p:tgtEl>
-                                          <p:spTgt spid="12"/>
-                                        </p:tgtEl>
-                                        <p:attrNameLst>
-                                          <p:attrName>style.visibility</p:attrName>
-                                        </p:attrNameLst>
-                                      </p:cBhvr>
-                                      <p:to>
-                                        <p:strVal val="visible"/>
-                                      </p:to>
-                                    </p:set>
-                                    <p:animEffect transition="in" filter="randombar(horizontal)">
-                                      <p:cBhvr>
-                                        <p:cTn id="10" dur="500"/>
-                                        <p:tgtEl>
-                                          <p:spTgt spid="12"/>
-                                        </p:tgtEl>
-                                      </p:cBhvr>
-                                    </p:animEffect>
-                                  </p:childTnLst>
-                                </p:cTn>
-                              </p:par>
-                            </p:childTnLst>
-                          </p:cTn>
-                        </p:par>
-                      </p:childTnLst>
-                    </p:cTn>
-                  </p:par>
-                </p:childTnLst>
-              </p:cTn>
-              <p:prevCondLst>
-                <p:cond evt="onPrev" delay="0">
-                  <p:tgtEl>
-                    <p:sldTgt/>
-                  </p:tgtEl>
-                </p:cond>
-              </p:prevCondLst>
-              <p:nextCondLst>
-                <p:cond evt="onNext" delay="0">
-                  <p:tgtEl>
-                    <p:sldTgt/>
-                  </p:tgtEl>
-                </p:cond>
-              </p:nextCondLst>
-            </p:seq>
-          </p:childTnLst>
-        </p:cTn>
-      </p:par>
-    </p:tnLst>
-  </p:timing>
 </p:sld>
 </file>
 

</xml_diff>